<commit_message>
📦 NEW: update logo
</commit_message>
<xml_diff>
--- a/admin/social/logo.pptx
+++ b/admin/social/logo.pptx
@@ -3362,7 +3362,7 @@
         </p:nvGrpSpPr>
         <p:grpSpPr>
           <a:xfrm>
-            <a:off x="2828141" y="161141"/>
+            <a:off x="525111" y="85344"/>
             <a:ext cx="6535717" cy="6535717"/>
             <a:chOff x="3753501" y="1066800"/>
             <a:chExt cx="4724400" cy="4724400"/>
@@ -4029,6 +4029,687 @@
           </p:style>
         </p:cxnSp>
       </p:grpSp>
+      <p:grpSp>
+        <p:nvGrpSpPr>
+          <p:cNvPr id="18" name="Group 17">
+            <a:extLst>
+              <a:ext uri="{FF2B5EF4-FFF2-40B4-BE49-F238E27FC236}">
+                <a16:creationId xmlns:a16="http://schemas.microsoft.com/office/drawing/2014/main" id="{02F4961A-1C1B-4AD4-9BB2-F746372703C6}"/>
+              </a:ext>
+            </a:extLst>
+          </p:cNvPr>
+          <p:cNvGrpSpPr/>
+          <p:nvPr/>
+        </p:nvGrpSpPr>
+        <p:grpSpPr>
+          <a:xfrm>
+            <a:off x="7320727" y="1341611"/>
+            <a:ext cx="3382295" cy="3382295"/>
+            <a:chOff x="3753501" y="1066800"/>
+            <a:chExt cx="4724400" cy="4724400"/>
+          </a:xfrm>
+        </p:grpSpPr>
+        <p:sp>
+          <p:nvSpPr>
+            <p:cNvPr id="19" name="Oval 18">
+              <a:extLst>
+                <a:ext uri="{FF2B5EF4-FFF2-40B4-BE49-F238E27FC236}">
+                  <a16:creationId xmlns:a16="http://schemas.microsoft.com/office/drawing/2014/main" id="{0E1F1E59-26CA-474D-AC08-1FA22FF6E13C}"/>
+                </a:ext>
+              </a:extLst>
+            </p:cNvPr>
+            <p:cNvSpPr/>
+            <p:nvPr/>
+          </p:nvSpPr>
+          <p:spPr>
+            <a:xfrm>
+              <a:off x="3753501" y="1066800"/>
+              <a:ext cx="4724400" cy="4724400"/>
+            </a:xfrm>
+            <a:prstGeom prst="ellipse">
+              <a:avLst/>
+            </a:prstGeom>
+            <a:gradFill>
+              <a:gsLst>
+                <a:gs pos="67000">
+                  <a:srgbClr val="5E6EE2"/>
+                </a:gs>
+                <a:gs pos="0">
+                  <a:srgbClr val="BC2CD4"/>
+                </a:gs>
+                <a:gs pos="100000">
+                  <a:srgbClr val="00B0F0"/>
+                </a:gs>
+              </a:gsLst>
+              <a:lin ang="0" scaled="0"/>
+            </a:gradFill>
+            <a:ln>
+              <a:noFill/>
+            </a:ln>
+          </p:spPr>
+          <p:style>
+            <a:lnRef idx="2">
+              <a:schemeClr val="accent1">
+                <a:shade val="50000"/>
+              </a:schemeClr>
+            </a:lnRef>
+            <a:fillRef idx="1">
+              <a:schemeClr val="accent1"/>
+            </a:fillRef>
+            <a:effectRef idx="0">
+              <a:schemeClr val="accent1"/>
+            </a:effectRef>
+            <a:fontRef idx="minor">
+              <a:schemeClr val="lt1"/>
+            </a:fontRef>
+          </p:style>
+          <p:txBody>
+            <a:bodyPr rtlCol="0" anchor="ctr"/>
+            <a:lstStyle/>
+            <a:p>
+              <a:pPr algn="ctr"/>
+              <a:endParaRPr lang="en-GB" dirty="0"/>
+            </a:p>
+          </p:txBody>
+        </p:sp>
+        <p:grpSp>
+          <p:nvGrpSpPr>
+            <p:cNvPr id="20" name="Group 19">
+              <a:extLst>
+                <a:ext uri="{FF2B5EF4-FFF2-40B4-BE49-F238E27FC236}">
+                  <a16:creationId xmlns:a16="http://schemas.microsoft.com/office/drawing/2014/main" id="{3BE2FC1B-481E-4E83-ACC0-327F5771B2A9}"/>
+                </a:ext>
+              </a:extLst>
+            </p:cNvPr>
+            <p:cNvGrpSpPr/>
+            <p:nvPr/>
+          </p:nvGrpSpPr>
+          <p:grpSpPr>
+            <a:xfrm rot="5400000">
+              <a:off x="4538497" y="2043426"/>
+              <a:ext cx="3154406" cy="2771149"/>
+              <a:chOff x="4194661" y="1758672"/>
+              <a:chExt cx="3802679" cy="3340657"/>
+            </a:xfrm>
+          </p:grpSpPr>
+          <p:sp>
+            <p:nvSpPr>
+              <p:cNvPr id="31" name="Oval 30">
+                <a:extLst>
+                  <a:ext uri="{FF2B5EF4-FFF2-40B4-BE49-F238E27FC236}">
+                    <a16:creationId xmlns:a16="http://schemas.microsoft.com/office/drawing/2014/main" id="{9457B5EA-6BA9-47B1-BE7F-CD26FE2DF3E8}"/>
+                  </a:ext>
+                </a:extLst>
+              </p:cNvPr>
+              <p:cNvSpPr/>
+              <p:nvPr/>
+            </p:nvSpPr>
+            <p:spPr>
+              <a:xfrm>
+                <a:off x="7544373" y="3202515"/>
+                <a:ext cx="452967" cy="452967"/>
+              </a:xfrm>
+              <a:prstGeom prst="ellipse">
+                <a:avLst/>
+              </a:prstGeom>
+              <a:noFill/>
+              <a:ln w="38100">
+                <a:solidFill>
+                  <a:schemeClr val="bg1"/>
+                </a:solidFill>
+              </a:ln>
+            </p:spPr>
+            <p:style>
+              <a:lnRef idx="2">
+                <a:schemeClr val="accent1">
+                  <a:shade val="50000"/>
+                </a:schemeClr>
+              </a:lnRef>
+              <a:fillRef idx="1">
+                <a:schemeClr val="accent1"/>
+              </a:fillRef>
+              <a:effectRef idx="0">
+                <a:schemeClr val="accent1"/>
+              </a:effectRef>
+              <a:fontRef idx="minor">
+                <a:schemeClr val="lt1"/>
+              </a:fontRef>
+            </p:style>
+            <p:txBody>
+              <a:bodyPr rtlCol="0" anchor="ctr"/>
+              <a:lstStyle/>
+              <a:p>
+                <a:pPr algn="ctr"/>
+                <a:endParaRPr lang="en-GB"/>
+              </a:p>
+            </p:txBody>
+          </p:sp>
+          <p:sp>
+            <p:nvSpPr>
+              <p:cNvPr id="32" name="Oval 31">
+                <a:extLst>
+                  <a:ext uri="{FF2B5EF4-FFF2-40B4-BE49-F238E27FC236}">
+                    <a16:creationId xmlns:a16="http://schemas.microsoft.com/office/drawing/2014/main" id="{198D3B0F-B1D3-48A9-9928-968E5F2ACE66}"/>
+                  </a:ext>
+                </a:extLst>
+              </p:cNvPr>
+              <p:cNvSpPr/>
+              <p:nvPr/>
+            </p:nvSpPr>
+            <p:spPr>
+              <a:xfrm>
+                <a:off x="6837485" y="1758673"/>
+                <a:ext cx="452967" cy="452967"/>
+              </a:xfrm>
+              <a:prstGeom prst="ellipse">
+                <a:avLst/>
+              </a:prstGeom>
+              <a:noFill/>
+              <a:ln w="38100">
+                <a:solidFill>
+                  <a:schemeClr val="bg1"/>
+                </a:solidFill>
+              </a:ln>
+            </p:spPr>
+            <p:style>
+              <a:lnRef idx="2">
+                <a:schemeClr val="accent1">
+                  <a:shade val="50000"/>
+                </a:schemeClr>
+              </a:lnRef>
+              <a:fillRef idx="1">
+                <a:schemeClr val="accent1"/>
+              </a:fillRef>
+              <a:effectRef idx="0">
+                <a:schemeClr val="accent1"/>
+              </a:effectRef>
+              <a:fontRef idx="minor">
+                <a:schemeClr val="lt1"/>
+              </a:fontRef>
+            </p:style>
+            <p:txBody>
+              <a:bodyPr rtlCol="0" anchor="ctr"/>
+              <a:lstStyle/>
+              <a:p>
+                <a:pPr algn="ctr"/>
+                <a:endParaRPr lang="en-GB"/>
+              </a:p>
+            </p:txBody>
+          </p:sp>
+          <p:sp>
+            <p:nvSpPr>
+              <p:cNvPr id="33" name="Oval 32">
+                <a:extLst>
+                  <a:ext uri="{FF2B5EF4-FFF2-40B4-BE49-F238E27FC236}">
+                    <a16:creationId xmlns:a16="http://schemas.microsoft.com/office/drawing/2014/main" id="{CE331E05-B0EA-4613-9F25-3D50C6907018}"/>
+                  </a:ext>
+                </a:extLst>
+              </p:cNvPr>
+              <p:cNvSpPr/>
+              <p:nvPr/>
+            </p:nvSpPr>
+            <p:spPr>
+              <a:xfrm>
+                <a:off x="4919172" y="1758672"/>
+                <a:ext cx="452967" cy="452967"/>
+              </a:xfrm>
+              <a:prstGeom prst="ellipse">
+                <a:avLst/>
+              </a:prstGeom>
+              <a:noFill/>
+              <a:ln w="38100">
+                <a:solidFill>
+                  <a:schemeClr val="bg1"/>
+                </a:solidFill>
+              </a:ln>
+            </p:spPr>
+            <p:style>
+              <a:lnRef idx="2">
+                <a:schemeClr val="accent1">
+                  <a:shade val="50000"/>
+                </a:schemeClr>
+              </a:lnRef>
+              <a:fillRef idx="1">
+                <a:schemeClr val="accent1"/>
+              </a:fillRef>
+              <a:effectRef idx="0">
+                <a:schemeClr val="accent1"/>
+              </a:effectRef>
+              <a:fontRef idx="minor">
+                <a:schemeClr val="lt1"/>
+              </a:fontRef>
+            </p:style>
+            <p:txBody>
+              <a:bodyPr rtlCol="0" anchor="ctr"/>
+              <a:lstStyle/>
+              <a:p>
+                <a:pPr algn="ctr"/>
+                <a:endParaRPr lang="en-GB"/>
+              </a:p>
+            </p:txBody>
+          </p:sp>
+          <p:sp>
+            <p:nvSpPr>
+              <p:cNvPr id="34" name="Oval 33">
+                <a:extLst>
+                  <a:ext uri="{FF2B5EF4-FFF2-40B4-BE49-F238E27FC236}">
+                    <a16:creationId xmlns:a16="http://schemas.microsoft.com/office/drawing/2014/main" id="{5AAD1BC6-69B1-4E7F-A47E-14EF0DC47715}"/>
+                  </a:ext>
+                </a:extLst>
+              </p:cNvPr>
+              <p:cNvSpPr/>
+              <p:nvPr/>
+            </p:nvSpPr>
+            <p:spPr>
+              <a:xfrm>
+                <a:off x="4194661" y="3202514"/>
+                <a:ext cx="452967" cy="452967"/>
+              </a:xfrm>
+              <a:prstGeom prst="ellipse">
+                <a:avLst/>
+              </a:prstGeom>
+              <a:noFill/>
+              <a:ln w="38100">
+                <a:solidFill>
+                  <a:schemeClr val="bg1"/>
+                </a:solidFill>
+              </a:ln>
+            </p:spPr>
+            <p:style>
+              <a:lnRef idx="2">
+                <a:schemeClr val="accent1">
+                  <a:shade val="50000"/>
+                </a:schemeClr>
+              </a:lnRef>
+              <a:fillRef idx="1">
+                <a:schemeClr val="accent1"/>
+              </a:fillRef>
+              <a:effectRef idx="0">
+                <a:schemeClr val="accent1"/>
+              </a:effectRef>
+              <a:fontRef idx="minor">
+                <a:schemeClr val="lt1"/>
+              </a:fontRef>
+            </p:style>
+            <p:txBody>
+              <a:bodyPr rtlCol="0" anchor="ctr"/>
+              <a:lstStyle/>
+              <a:p>
+                <a:pPr algn="ctr"/>
+                <a:endParaRPr lang="en-GB"/>
+              </a:p>
+            </p:txBody>
+          </p:sp>
+          <p:sp>
+            <p:nvSpPr>
+              <p:cNvPr id="35" name="Oval 34">
+                <a:extLst>
+                  <a:ext uri="{FF2B5EF4-FFF2-40B4-BE49-F238E27FC236}">
+                    <a16:creationId xmlns:a16="http://schemas.microsoft.com/office/drawing/2014/main" id="{5844121E-2743-4803-8C30-A41F23993CF5}"/>
+                  </a:ext>
+                </a:extLst>
+              </p:cNvPr>
+              <p:cNvSpPr/>
+              <p:nvPr/>
+            </p:nvSpPr>
+            <p:spPr>
+              <a:xfrm>
+                <a:off x="4919172" y="4646362"/>
+                <a:ext cx="452967" cy="452967"/>
+              </a:xfrm>
+              <a:prstGeom prst="ellipse">
+                <a:avLst/>
+              </a:prstGeom>
+              <a:noFill/>
+              <a:ln w="38100">
+                <a:solidFill>
+                  <a:schemeClr val="bg1"/>
+                </a:solidFill>
+              </a:ln>
+            </p:spPr>
+            <p:style>
+              <a:lnRef idx="2">
+                <a:schemeClr val="accent1">
+                  <a:shade val="50000"/>
+                </a:schemeClr>
+              </a:lnRef>
+              <a:fillRef idx="1">
+                <a:schemeClr val="accent1"/>
+              </a:fillRef>
+              <a:effectRef idx="0">
+                <a:schemeClr val="accent1"/>
+              </a:effectRef>
+              <a:fontRef idx="minor">
+                <a:schemeClr val="lt1"/>
+              </a:fontRef>
+            </p:style>
+            <p:txBody>
+              <a:bodyPr rtlCol="0" anchor="ctr"/>
+              <a:lstStyle/>
+              <a:p>
+                <a:pPr algn="ctr"/>
+                <a:endParaRPr lang="en-GB"/>
+              </a:p>
+            </p:txBody>
+          </p:sp>
+          <p:sp>
+            <p:nvSpPr>
+              <p:cNvPr id="36" name="Oval 35">
+                <a:extLst>
+                  <a:ext uri="{FF2B5EF4-FFF2-40B4-BE49-F238E27FC236}">
+                    <a16:creationId xmlns:a16="http://schemas.microsoft.com/office/drawing/2014/main" id="{CF480289-4374-4502-AFA9-893DFC837355}"/>
+                  </a:ext>
+                </a:extLst>
+              </p:cNvPr>
+              <p:cNvSpPr/>
+              <p:nvPr/>
+            </p:nvSpPr>
+            <p:spPr>
+              <a:xfrm>
+                <a:off x="6815707" y="4646358"/>
+                <a:ext cx="452967" cy="452967"/>
+              </a:xfrm>
+              <a:prstGeom prst="ellipse">
+                <a:avLst/>
+              </a:prstGeom>
+              <a:noFill/>
+              <a:ln w="38100">
+                <a:solidFill>
+                  <a:schemeClr val="bg1"/>
+                </a:solidFill>
+              </a:ln>
+            </p:spPr>
+            <p:style>
+              <a:lnRef idx="2">
+                <a:schemeClr val="accent1">
+                  <a:shade val="50000"/>
+                </a:schemeClr>
+              </a:lnRef>
+              <a:fillRef idx="1">
+                <a:schemeClr val="accent1"/>
+              </a:fillRef>
+              <a:effectRef idx="0">
+                <a:schemeClr val="accent1"/>
+              </a:effectRef>
+              <a:fontRef idx="minor">
+                <a:schemeClr val="lt1"/>
+              </a:fontRef>
+            </p:style>
+            <p:txBody>
+              <a:bodyPr rtlCol="0" anchor="ctr"/>
+              <a:lstStyle/>
+              <a:p>
+                <a:pPr algn="ctr"/>
+                <a:endParaRPr lang="en-GB"/>
+              </a:p>
+            </p:txBody>
+          </p:sp>
+        </p:grpSp>
+        <p:cxnSp>
+          <p:nvCxnSpPr>
+            <p:cNvPr id="25" name="Straight Connector 24">
+              <a:extLst>
+                <a:ext uri="{FF2B5EF4-FFF2-40B4-BE49-F238E27FC236}">
+                  <a16:creationId xmlns:a16="http://schemas.microsoft.com/office/drawing/2014/main" id="{04253A48-9C64-4DCD-959C-78E527D523DD}"/>
+                </a:ext>
+              </a:extLst>
+            </p:cNvPr>
+            <p:cNvCxnSpPr>
+              <a:stCxn id="34" idx="0"/>
+              <a:endCxn id="33" idx="3"/>
+            </p:cNvCxnSpPr>
+            <p:nvPr/>
+          </p:nvCxnSpPr>
+          <p:spPr>
+            <a:xfrm>
+              <a:off x="6303575" y="2039670"/>
+              <a:ext cx="876980" cy="468152"/>
+            </a:xfrm>
+            <a:prstGeom prst="line">
+              <a:avLst/>
+            </a:prstGeom>
+            <a:ln w="38100">
+              <a:solidFill>
+                <a:schemeClr val="bg1"/>
+              </a:solidFill>
+            </a:ln>
+          </p:spPr>
+          <p:style>
+            <a:lnRef idx="1">
+              <a:schemeClr val="accent1"/>
+            </a:lnRef>
+            <a:fillRef idx="0">
+              <a:schemeClr val="accent1"/>
+            </a:fillRef>
+            <a:effectRef idx="0">
+              <a:schemeClr val="accent1"/>
+            </a:effectRef>
+            <a:fontRef idx="minor">
+              <a:schemeClr val="tx1"/>
+            </a:fontRef>
+          </p:style>
+        </p:cxnSp>
+        <p:cxnSp>
+          <p:nvCxnSpPr>
+            <p:cNvPr id="26" name="Straight Connector 25">
+              <a:extLst>
+                <a:ext uri="{FF2B5EF4-FFF2-40B4-BE49-F238E27FC236}">
+                  <a16:creationId xmlns:a16="http://schemas.microsoft.com/office/drawing/2014/main" id="{353F7057-C243-4ECC-931B-2553CDF98EE3}"/>
+                </a:ext>
+              </a:extLst>
+            </p:cNvPr>
+            <p:cNvCxnSpPr>
+              <a:stCxn id="35" idx="1"/>
+              <a:endCxn id="34" idx="4"/>
+            </p:cNvCxnSpPr>
+            <p:nvPr/>
+          </p:nvCxnSpPr>
+          <p:spPr>
+            <a:xfrm flipV="1">
+              <a:off x="5050845" y="2039670"/>
+              <a:ext cx="876984" cy="468152"/>
+            </a:xfrm>
+            <a:prstGeom prst="line">
+              <a:avLst/>
+            </a:prstGeom>
+            <a:ln w="38100">
+              <a:solidFill>
+                <a:schemeClr val="bg1"/>
+              </a:solidFill>
+            </a:ln>
+          </p:spPr>
+          <p:style>
+            <a:lnRef idx="1">
+              <a:schemeClr val="accent1"/>
+            </a:lnRef>
+            <a:fillRef idx="0">
+              <a:schemeClr val="accent1"/>
+            </a:fillRef>
+            <a:effectRef idx="0">
+              <a:schemeClr val="accent1"/>
+            </a:effectRef>
+            <a:fontRef idx="minor">
+              <a:schemeClr val="tx1"/>
+            </a:fontRef>
+          </p:style>
+        </p:cxnSp>
+        <p:cxnSp>
+          <p:nvCxnSpPr>
+            <p:cNvPr id="27" name="Straight Connector 26">
+              <a:extLst>
+                <a:ext uri="{FF2B5EF4-FFF2-40B4-BE49-F238E27FC236}">
+                  <a16:creationId xmlns:a16="http://schemas.microsoft.com/office/drawing/2014/main" id="{D5062895-E013-43B8-BECE-893BA0A142FD}"/>
+                </a:ext>
+              </a:extLst>
+            </p:cNvPr>
+            <p:cNvCxnSpPr>
+              <a:stCxn id="33" idx="5"/>
+              <a:endCxn id="36" idx="1"/>
+            </p:cNvCxnSpPr>
+            <p:nvPr/>
+          </p:nvCxnSpPr>
+          <p:spPr>
+            <a:xfrm flipH="1">
+              <a:off x="5050848" y="2773514"/>
+              <a:ext cx="2129707" cy="1307526"/>
+            </a:xfrm>
+            <a:prstGeom prst="line">
+              <a:avLst/>
+            </a:prstGeom>
+            <a:ln w="38100">
+              <a:solidFill>
+                <a:schemeClr val="bg1"/>
+              </a:solidFill>
+            </a:ln>
+          </p:spPr>
+          <p:style>
+            <a:lnRef idx="1">
+              <a:schemeClr val="accent1"/>
+            </a:lnRef>
+            <a:fillRef idx="0">
+              <a:schemeClr val="accent1"/>
+            </a:fillRef>
+            <a:effectRef idx="0">
+              <a:schemeClr val="accent1"/>
+            </a:effectRef>
+            <a:fontRef idx="minor">
+              <a:schemeClr val="tx1"/>
+            </a:fontRef>
+          </p:style>
+        </p:cxnSp>
+        <p:cxnSp>
+          <p:nvCxnSpPr>
+            <p:cNvPr id="28" name="Straight Connector 27">
+              <a:extLst>
+                <a:ext uri="{FF2B5EF4-FFF2-40B4-BE49-F238E27FC236}">
+                  <a16:creationId xmlns:a16="http://schemas.microsoft.com/office/drawing/2014/main" id="{1C33D08E-6088-4367-9FD0-3B1A4D2D3FD7}"/>
+                </a:ext>
+              </a:extLst>
+            </p:cNvPr>
+            <p:cNvCxnSpPr>
+              <a:stCxn id="35" idx="6"/>
+              <a:endCxn id="36" idx="2"/>
+            </p:cNvCxnSpPr>
+            <p:nvPr/>
+          </p:nvCxnSpPr>
+          <p:spPr>
+            <a:xfrm>
+              <a:off x="4917999" y="2828541"/>
+              <a:ext cx="3" cy="1197472"/>
+            </a:xfrm>
+            <a:prstGeom prst="line">
+              <a:avLst/>
+            </a:prstGeom>
+            <a:ln w="38100">
+              <a:solidFill>
+                <a:schemeClr val="bg1"/>
+              </a:solidFill>
+            </a:ln>
+          </p:spPr>
+          <p:style>
+            <a:lnRef idx="1">
+              <a:schemeClr val="accent1"/>
+            </a:lnRef>
+            <a:fillRef idx="0">
+              <a:schemeClr val="accent1"/>
+            </a:fillRef>
+            <a:effectRef idx="0">
+              <a:schemeClr val="accent1"/>
+            </a:effectRef>
+            <a:fontRef idx="minor">
+              <a:schemeClr val="tx1"/>
+            </a:fontRef>
+          </p:style>
+        </p:cxnSp>
+        <p:cxnSp>
+          <p:nvCxnSpPr>
+            <p:cNvPr id="29" name="Straight Connector 28">
+              <a:extLst>
+                <a:ext uri="{FF2B5EF4-FFF2-40B4-BE49-F238E27FC236}">
+                  <a16:creationId xmlns:a16="http://schemas.microsoft.com/office/drawing/2014/main" id="{755E5AAC-9E50-4EFB-8698-E910322BE349}"/>
+                </a:ext>
+              </a:extLst>
+            </p:cNvPr>
+            <p:cNvCxnSpPr>
+              <a:stCxn id="36" idx="7"/>
+              <a:endCxn id="31" idx="3"/>
+            </p:cNvCxnSpPr>
+            <p:nvPr/>
+          </p:nvCxnSpPr>
+          <p:spPr>
+            <a:xfrm>
+              <a:off x="5050848" y="4346732"/>
+              <a:ext cx="876981" cy="471598"/>
+            </a:xfrm>
+            <a:prstGeom prst="line">
+              <a:avLst/>
+            </a:prstGeom>
+            <a:ln w="38100">
+              <a:solidFill>
+                <a:schemeClr val="bg1"/>
+              </a:solidFill>
+            </a:ln>
+          </p:spPr>
+          <p:style>
+            <a:lnRef idx="1">
+              <a:schemeClr val="accent1"/>
+            </a:lnRef>
+            <a:fillRef idx="0">
+              <a:schemeClr val="accent1"/>
+            </a:fillRef>
+            <a:effectRef idx="0">
+              <a:schemeClr val="accent1"/>
+            </a:effectRef>
+            <a:fontRef idx="minor">
+              <a:schemeClr val="tx1"/>
+            </a:fontRef>
+          </p:style>
+        </p:cxnSp>
+        <p:cxnSp>
+          <p:nvCxnSpPr>
+            <p:cNvPr id="30" name="Straight Connector 29">
+              <a:extLst>
+                <a:ext uri="{FF2B5EF4-FFF2-40B4-BE49-F238E27FC236}">
+                  <a16:creationId xmlns:a16="http://schemas.microsoft.com/office/drawing/2014/main" id="{66FEE6C1-7980-4058-9D21-76A9CD9D8582}"/>
+                </a:ext>
+              </a:extLst>
+            </p:cNvPr>
+            <p:cNvCxnSpPr>
+              <a:stCxn id="32" idx="5"/>
+              <a:endCxn id="31" idx="0"/>
+            </p:cNvCxnSpPr>
+            <p:nvPr/>
+          </p:nvCxnSpPr>
+          <p:spPr>
+            <a:xfrm flipH="1">
+              <a:off x="6303575" y="4364797"/>
+              <a:ext cx="876980" cy="453533"/>
+            </a:xfrm>
+            <a:prstGeom prst="line">
+              <a:avLst/>
+            </a:prstGeom>
+            <a:ln w="38100">
+              <a:solidFill>
+                <a:schemeClr val="bg1"/>
+              </a:solidFill>
+            </a:ln>
+          </p:spPr>
+          <p:style>
+            <a:lnRef idx="1">
+              <a:schemeClr val="accent1"/>
+            </a:lnRef>
+            <a:fillRef idx="0">
+              <a:schemeClr val="accent1"/>
+            </a:fillRef>
+            <a:effectRef idx="0">
+              <a:schemeClr val="accent1"/>
+            </a:effectRef>
+            <a:fontRef idx="minor">
+              <a:schemeClr val="tx1"/>
+            </a:fontRef>
+          </p:style>
+        </p:cxnSp>
+      </p:grpSp>
     </p:spTree>
     <p:extLst>
       <p:ext uri="{BB962C8B-B14F-4D97-AF65-F5344CB8AC3E}">
@@ -4069,12 +4750,127 @@
           <a:chExt cx="0" cy="0"/>
         </a:xfrm>
       </p:grpSpPr>
+      <p:sp>
+        <p:nvSpPr>
+          <p:cNvPr id="21" name="Rectangle 20">
+            <a:extLst>
+              <a:ext uri="{FF2B5EF4-FFF2-40B4-BE49-F238E27FC236}">
+                <a16:creationId xmlns:a16="http://schemas.microsoft.com/office/drawing/2014/main" id="{ADF583DC-FFA7-463C-8FA7-3F5F3293FD5A}"/>
+              </a:ext>
+            </a:extLst>
+          </p:cNvPr>
+          <p:cNvSpPr/>
+          <p:nvPr/>
+        </p:nvSpPr>
+        <p:spPr>
+          <a:xfrm>
+            <a:off x="0" y="381000"/>
+            <a:ext cx="12192000" cy="6096000"/>
+          </a:xfrm>
+          <a:prstGeom prst="rect">
+            <a:avLst/>
+          </a:prstGeom>
+          <a:gradFill>
+            <a:gsLst>
+              <a:gs pos="67000">
+                <a:srgbClr val="5E6EE2"/>
+              </a:gs>
+              <a:gs pos="0">
+                <a:srgbClr val="BC2CD4"/>
+              </a:gs>
+              <a:gs pos="100000">
+                <a:srgbClr val="00B0F0"/>
+              </a:gs>
+            </a:gsLst>
+            <a:lin ang="9000000" scaled="0"/>
+          </a:gradFill>
+          <a:ln>
+            <a:noFill/>
+          </a:ln>
+        </p:spPr>
+        <p:style>
+          <a:lnRef idx="2">
+            <a:schemeClr val="accent1">
+              <a:shade val="50000"/>
+            </a:schemeClr>
+          </a:lnRef>
+          <a:fillRef idx="1">
+            <a:schemeClr val="accent1"/>
+          </a:fillRef>
+          <a:effectRef idx="0">
+            <a:schemeClr val="accent1"/>
+          </a:effectRef>
+          <a:fontRef idx="minor">
+            <a:schemeClr val="lt1"/>
+          </a:fontRef>
+        </p:style>
+        <p:txBody>
+          <a:bodyPr rtlCol="0" anchor="ctr"/>
+          <a:lstStyle/>
+          <a:p>
+            <a:pPr algn="ctr"/>
+            <a:endParaRPr lang="en-GB"/>
+          </a:p>
+        </p:txBody>
+      </p:sp>
+      <p:sp>
+        <p:nvSpPr>
+          <p:cNvPr id="23" name="Rectangle 22">
+            <a:extLst>
+              <a:ext uri="{FF2B5EF4-FFF2-40B4-BE49-F238E27FC236}">
+                <a16:creationId xmlns:a16="http://schemas.microsoft.com/office/drawing/2014/main" id="{A8A3DE9C-E741-470F-8438-52A9A46A3C45}"/>
+              </a:ext>
+            </a:extLst>
+          </p:cNvPr>
+          <p:cNvSpPr/>
+          <p:nvPr/>
+        </p:nvSpPr>
+        <p:spPr>
+          <a:xfrm>
+            <a:off x="914881" y="1099432"/>
+            <a:ext cx="10362235" cy="4656667"/>
+          </a:xfrm>
+          <a:prstGeom prst="rect">
+            <a:avLst/>
+          </a:prstGeom>
+          <a:solidFill>
+            <a:schemeClr val="bg1"/>
+          </a:solidFill>
+          <a:ln>
+            <a:noFill/>
+          </a:ln>
+        </p:spPr>
+        <p:style>
+          <a:lnRef idx="2">
+            <a:schemeClr val="accent1">
+              <a:shade val="50000"/>
+            </a:schemeClr>
+          </a:lnRef>
+          <a:fillRef idx="1">
+            <a:schemeClr val="accent1"/>
+          </a:fillRef>
+          <a:effectRef idx="0">
+            <a:schemeClr val="accent1"/>
+          </a:effectRef>
+          <a:fontRef idx="minor">
+            <a:schemeClr val="lt1"/>
+          </a:fontRef>
+        </p:style>
+        <p:txBody>
+          <a:bodyPr rtlCol="0" anchor="ctr"/>
+          <a:lstStyle/>
+          <a:p>
+            <a:pPr algn="ctr"/>
+            <a:endParaRPr lang="en-GB" dirty="0"/>
+          </a:p>
+        </p:txBody>
+      </p:sp>
       <p:grpSp>
         <p:nvGrpSpPr>
-          <p:cNvPr id="24" name="Group 23">
-            <a:extLst>
-              <a:ext uri="{FF2B5EF4-FFF2-40B4-BE49-F238E27FC236}">
-                <a16:creationId xmlns:a16="http://schemas.microsoft.com/office/drawing/2014/main" id="{384BECFA-FE6A-41F1-A9EA-2ABF3BA9A835}"/>
+          <p:cNvPr id="4" name="Group 3">
+            <a:extLst>
+              <a:ext uri="{FF2B5EF4-FFF2-40B4-BE49-F238E27FC236}">
+                <a16:creationId xmlns:a16="http://schemas.microsoft.com/office/drawing/2014/main" id="{B9BDDB51-B995-444C-9C94-ECB82A2172CD}"/>
               </a:ext>
             </a:extLst>
           </p:cNvPr>
@@ -4083,18 +4879,18 @@
         </p:nvGrpSpPr>
         <p:grpSpPr>
           <a:xfrm>
-            <a:off x="0" y="381000"/>
-            <a:ext cx="12192000" cy="6096000"/>
-            <a:chOff x="0" y="381000"/>
-            <a:chExt cx="12192000" cy="6096000"/>
+            <a:off x="4404852" y="1737852"/>
+            <a:ext cx="3382295" cy="3382295"/>
+            <a:chOff x="3753501" y="1066800"/>
+            <a:chExt cx="4724400" cy="4724400"/>
           </a:xfrm>
         </p:grpSpPr>
         <p:sp>
           <p:nvSpPr>
-            <p:cNvPr id="21" name="Rectangle 20">
+            <p:cNvPr id="5" name="Oval 4">
               <a:extLst>
                 <a:ext uri="{FF2B5EF4-FFF2-40B4-BE49-F238E27FC236}">
-                  <a16:creationId xmlns:a16="http://schemas.microsoft.com/office/drawing/2014/main" id="{ADF583DC-FFA7-463C-8FA7-3F5F3293FD5A}"/>
+                  <a16:creationId xmlns:a16="http://schemas.microsoft.com/office/drawing/2014/main" id="{881B783C-B211-40CB-B1F9-ED10CEB477BA}"/>
                 </a:ext>
               </a:extLst>
             </p:cNvPr>
@@ -4103,10 +4899,10 @@
           </p:nvSpPr>
           <p:spPr>
             <a:xfrm>
-              <a:off x="0" y="381000"/>
-              <a:ext cx="12192000" cy="6096000"/>
+              <a:off x="3753501" y="1066800"/>
+              <a:ext cx="4724400" cy="4724400"/>
             </a:xfrm>
-            <a:prstGeom prst="rect">
+            <a:prstGeom prst="ellipse">
               <a:avLst/>
             </a:prstGeom>
             <a:gradFill>
@@ -4121,60 +4917,8 @@
                   <a:srgbClr val="00B0F0"/>
                 </a:gs>
               </a:gsLst>
-              <a:lin ang="9000000" scaled="0"/>
+              <a:lin ang="0" scaled="0"/>
             </a:gradFill>
-            <a:ln>
-              <a:noFill/>
-            </a:ln>
-          </p:spPr>
-          <p:style>
-            <a:lnRef idx="2">
-              <a:schemeClr val="accent1">
-                <a:shade val="50000"/>
-              </a:schemeClr>
-            </a:lnRef>
-            <a:fillRef idx="1">
-              <a:schemeClr val="accent1"/>
-            </a:fillRef>
-            <a:effectRef idx="0">
-              <a:schemeClr val="accent1"/>
-            </a:effectRef>
-            <a:fontRef idx="minor">
-              <a:schemeClr val="lt1"/>
-            </a:fontRef>
-          </p:style>
-          <p:txBody>
-            <a:bodyPr rtlCol="0" anchor="ctr"/>
-            <a:lstStyle/>
-            <a:p>
-              <a:pPr algn="ctr"/>
-              <a:endParaRPr lang="en-GB"/>
-            </a:p>
-          </p:txBody>
-        </p:sp>
-        <p:sp>
-          <p:nvSpPr>
-            <p:cNvPr id="23" name="Rectangle 22">
-              <a:extLst>
-                <a:ext uri="{FF2B5EF4-FFF2-40B4-BE49-F238E27FC236}">
-                  <a16:creationId xmlns:a16="http://schemas.microsoft.com/office/drawing/2014/main" id="{A8A3DE9C-E741-470F-8438-52A9A46A3C45}"/>
-                </a:ext>
-              </a:extLst>
-            </p:cNvPr>
-            <p:cNvSpPr/>
-            <p:nvPr/>
-          </p:nvSpPr>
-          <p:spPr>
-            <a:xfrm>
-              <a:off x="914881" y="1099432"/>
-              <a:ext cx="10362235" cy="4656667"/>
-            </a:xfrm>
-            <a:prstGeom prst="rect">
-              <a:avLst/>
-            </a:prstGeom>
-            <a:solidFill>
-              <a:schemeClr val="bg1"/>
-            </a:solidFill>
             <a:ln>
               <a:noFill/>
             </a:ln>
@@ -4206,10 +4950,10 @@
         </p:sp>
         <p:grpSp>
           <p:nvGrpSpPr>
-            <p:cNvPr id="4" name="Group 3">
+            <p:cNvPr id="6" name="Group 5">
               <a:extLst>
                 <a:ext uri="{FF2B5EF4-FFF2-40B4-BE49-F238E27FC236}">
-                  <a16:creationId xmlns:a16="http://schemas.microsoft.com/office/drawing/2014/main" id="{B9BDDB51-B995-444C-9C94-ECB82A2172CD}"/>
+                  <a16:creationId xmlns:a16="http://schemas.microsoft.com/office/drawing/2014/main" id="{5BE7B77D-AFE8-4E14-92DB-177E14EF961F}"/>
                 </a:ext>
               </a:extLst>
             </p:cNvPr>
@@ -4217,19 +4961,19 @@
             <p:nvPr/>
           </p:nvGrpSpPr>
           <p:grpSpPr>
-            <a:xfrm>
-              <a:off x="4404852" y="1737852"/>
-              <a:ext cx="3382295" cy="3382295"/>
-              <a:chOff x="3753501" y="1066800"/>
-              <a:chExt cx="4724400" cy="4724400"/>
+            <a:xfrm rot="5400000">
+              <a:off x="4538497" y="2043426"/>
+              <a:ext cx="3154406" cy="2771149"/>
+              <a:chOff x="4194661" y="1758672"/>
+              <a:chExt cx="3802679" cy="3340657"/>
             </a:xfrm>
           </p:grpSpPr>
           <p:sp>
             <p:nvSpPr>
-              <p:cNvPr id="5" name="Oval 4">
+              <p:cNvPr id="13" name="Oval 12">
                 <a:extLst>
                   <a:ext uri="{FF2B5EF4-FFF2-40B4-BE49-F238E27FC236}">
-                    <a16:creationId xmlns:a16="http://schemas.microsoft.com/office/drawing/2014/main" id="{881B783C-B211-40CB-B1F9-ED10CEB477BA}"/>
+                    <a16:creationId xmlns:a16="http://schemas.microsoft.com/office/drawing/2014/main" id="{8E29A398-1034-4C60-80EE-1A1015EE1F85}"/>
                   </a:ext>
                 </a:extLst>
               </p:cNvPr>
@@ -4238,28 +4982,17 @@
             </p:nvSpPr>
             <p:spPr>
               <a:xfrm>
-                <a:off x="3753501" y="1066800"/>
-                <a:ext cx="4724400" cy="4724400"/>
+                <a:off x="7544373" y="3202515"/>
+                <a:ext cx="452967" cy="452967"/>
               </a:xfrm>
               <a:prstGeom prst="ellipse">
                 <a:avLst/>
               </a:prstGeom>
-              <a:gradFill>
-                <a:gsLst>
-                  <a:gs pos="67000">
-                    <a:srgbClr val="5E6EE2"/>
-                  </a:gs>
-                  <a:gs pos="0">
-                    <a:srgbClr val="BC2CD4"/>
-                  </a:gs>
-                  <a:gs pos="100000">
-                    <a:srgbClr val="00B0F0"/>
-                  </a:gs>
-                </a:gsLst>
-                <a:lin ang="0" scaled="0"/>
-              </a:gradFill>
-              <a:ln>
-                <a:noFill/>
+              <a:noFill/>
+              <a:ln w="38100">
+                <a:solidFill>
+                  <a:schemeClr val="bg1"/>
+                </a:solidFill>
               </a:ln>
             </p:spPr>
             <p:style>
@@ -4283,366 +5016,31 @@
               <a:lstStyle/>
               <a:p>
                 <a:pPr algn="ctr"/>
-                <a:endParaRPr lang="en-GB" dirty="0"/>
+                <a:endParaRPr lang="en-GB"/>
               </a:p>
             </p:txBody>
           </p:sp>
-          <p:grpSp>
-            <p:nvGrpSpPr>
-              <p:cNvPr id="6" name="Group 5">
+          <p:sp>
+            <p:nvSpPr>
+              <p:cNvPr id="14" name="Oval 13">
                 <a:extLst>
                   <a:ext uri="{FF2B5EF4-FFF2-40B4-BE49-F238E27FC236}">
-                    <a16:creationId xmlns:a16="http://schemas.microsoft.com/office/drawing/2014/main" id="{5BE7B77D-AFE8-4E14-92DB-177E14EF961F}"/>
+                    <a16:creationId xmlns:a16="http://schemas.microsoft.com/office/drawing/2014/main" id="{2CB75BDD-4257-4230-9411-C67A93568D31}"/>
                   </a:ext>
                 </a:extLst>
               </p:cNvPr>
-              <p:cNvGrpSpPr/>
+              <p:cNvSpPr/>
               <p:nvPr/>
-            </p:nvGrpSpPr>
-            <p:grpSpPr>
-              <a:xfrm rot="5400000">
-                <a:off x="4538497" y="2043426"/>
-                <a:ext cx="3154406" cy="2771149"/>
-                <a:chOff x="4194661" y="1758672"/>
-                <a:chExt cx="3802679" cy="3340657"/>
-              </a:xfrm>
-            </p:grpSpPr>
-            <p:sp>
-              <p:nvSpPr>
-                <p:cNvPr id="13" name="Oval 12">
-                  <a:extLst>
-                    <a:ext uri="{FF2B5EF4-FFF2-40B4-BE49-F238E27FC236}">
-                      <a16:creationId xmlns:a16="http://schemas.microsoft.com/office/drawing/2014/main" id="{8E29A398-1034-4C60-80EE-1A1015EE1F85}"/>
-                    </a:ext>
-                  </a:extLst>
-                </p:cNvPr>
-                <p:cNvSpPr/>
-                <p:nvPr/>
-              </p:nvSpPr>
-              <p:spPr>
-                <a:xfrm>
-                  <a:off x="7544373" y="3202515"/>
-                  <a:ext cx="452967" cy="452967"/>
-                </a:xfrm>
-                <a:prstGeom prst="ellipse">
-                  <a:avLst/>
-                </a:prstGeom>
-                <a:noFill/>
-                <a:ln w="38100">
-                  <a:solidFill>
-                    <a:schemeClr val="bg1"/>
-                  </a:solidFill>
-                </a:ln>
-              </p:spPr>
-              <p:style>
-                <a:lnRef idx="2">
-                  <a:schemeClr val="accent1">
-                    <a:shade val="50000"/>
-                  </a:schemeClr>
-                </a:lnRef>
-                <a:fillRef idx="1">
-                  <a:schemeClr val="accent1"/>
-                </a:fillRef>
-                <a:effectRef idx="0">
-                  <a:schemeClr val="accent1"/>
-                </a:effectRef>
-                <a:fontRef idx="minor">
-                  <a:schemeClr val="lt1"/>
-                </a:fontRef>
-              </p:style>
-              <p:txBody>
-                <a:bodyPr rtlCol="0" anchor="ctr"/>
-                <a:lstStyle/>
-                <a:p>
-                  <a:pPr algn="ctr"/>
-                  <a:endParaRPr lang="en-GB"/>
-                </a:p>
-              </p:txBody>
-            </p:sp>
-            <p:sp>
-              <p:nvSpPr>
-                <p:cNvPr id="14" name="Oval 13">
-                  <a:extLst>
-                    <a:ext uri="{FF2B5EF4-FFF2-40B4-BE49-F238E27FC236}">
-                      <a16:creationId xmlns:a16="http://schemas.microsoft.com/office/drawing/2014/main" id="{2CB75BDD-4257-4230-9411-C67A93568D31}"/>
-                    </a:ext>
-                  </a:extLst>
-                </p:cNvPr>
-                <p:cNvSpPr/>
-                <p:nvPr/>
-              </p:nvSpPr>
-              <p:spPr>
-                <a:xfrm>
-                  <a:off x="6837485" y="1758673"/>
-                  <a:ext cx="452967" cy="452967"/>
-                </a:xfrm>
-                <a:prstGeom prst="ellipse">
-                  <a:avLst/>
-                </a:prstGeom>
-                <a:noFill/>
-                <a:ln w="38100">
-                  <a:solidFill>
-                    <a:schemeClr val="bg1"/>
-                  </a:solidFill>
-                </a:ln>
-              </p:spPr>
-              <p:style>
-                <a:lnRef idx="2">
-                  <a:schemeClr val="accent1">
-                    <a:shade val="50000"/>
-                  </a:schemeClr>
-                </a:lnRef>
-                <a:fillRef idx="1">
-                  <a:schemeClr val="accent1"/>
-                </a:fillRef>
-                <a:effectRef idx="0">
-                  <a:schemeClr val="accent1"/>
-                </a:effectRef>
-                <a:fontRef idx="minor">
-                  <a:schemeClr val="lt1"/>
-                </a:fontRef>
-              </p:style>
-              <p:txBody>
-                <a:bodyPr rtlCol="0" anchor="ctr"/>
-                <a:lstStyle/>
-                <a:p>
-                  <a:pPr algn="ctr"/>
-                  <a:endParaRPr lang="en-GB"/>
-                </a:p>
-              </p:txBody>
-            </p:sp>
-            <p:sp>
-              <p:nvSpPr>
-                <p:cNvPr id="15" name="Oval 14">
-                  <a:extLst>
-                    <a:ext uri="{FF2B5EF4-FFF2-40B4-BE49-F238E27FC236}">
-                      <a16:creationId xmlns:a16="http://schemas.microsoft.com/office/drawing/2014/main" id="{539B73C9-A0EC-46DB-A5FF-7B3E5B34AB1E}"/>
-                    </a:ext>
-                  </a:extLst>
-                </p:cNvPr>
-                <p:cNvSpPr/>
-                <p:nvPr/>
-              </p:nvSpPr>
-              <p:spPr>
-                <a:xfrm>
-                  <a:off x="4919172" y="1758672"/>
-                  <a:ext cx="452967" cy="452967"/>
-                </a:xfrm>
-                <a:prstGeom prst="ellipse">
-                  <a:avLst/>
-                </a:prstGeom>
-                <a:noFill/>
-                <a:ln w="38100">
-                  <a:solidFill>
-                    <a:schemeClr val="bg1"/>
-                  </a:solidFill>
-                </a:ln>
-              </p:spPr>
-              <p:style>
-                <a:lnRef idx="2">
-                  <a:schemeClr val="accent1">
-                    <a:shade val="50000"/>
-                  </a:schemeClr>
-                </a:lnRef>
-                <a:fillRef idx="1">
-                  <a:schemeClr val="accent1"/>
-                </a:fillRef>
-                <a:effectRef idx="0">
-                  <a:schemeClr val="accent1"/>
-                </a:effectRef>
-                <a:fontRef idx="minor">
-                  <a:schemeClr val="lt1"/>
-                </a:fontRef>
-              </p:style>
-              <p:txBody>
-                <a:bodyPr rtlCol="0" anchor="ctr"/>
-                <a:lstStyle/>
-                <a:p>
-                  <a:pPr algn="ctr"/>
-                  <a:endParaRPr lang="en-GB"/>
-                </a:p>
-              </p:txBody>
-            </p:sp>
-            <p:sp>
-              <p:nvSpPr>
-                <p:cNvPr id="16" name="Oval 15">
-                  <a:extLst>
-                    <a:ext uri="{FF2B5EF4-FFF2-40B4-BE49-F238E27FC236}">
-                      <a16:creationId xmlns:a16="http://schemas.microsoft.com/office/drawing/2014/main" id="{73FC7C1C-F127-4FB7-AB11-390D6492462C}"/>
-                    </a:ext>
-                  </a:extLst>
-                </p:cNvPr>
-                <p:cNvSpPr/>
-                <p:nvPr/>
-              </p:nvSpPr>
-              <p:spPr>
-                <a:xfrm>
-                  <a:off x="4194661" y="3202514"/>
-                  <a:ext cx="452967" cy="452967"/>
-                </a:xfrm>
-                <a:prstGeom prst="ellipse">
-                  <a:avLst/>
-                </a:prstGeom>
-                <a:noFill/>
-                <a:ln w="38100">
-                  <a:solidFill>
-                    <a:schemeClr val="bg1"/>
-                  </a:solidFill>
-                </a:ln>
-              </p:spPr>
-              <p:style>
-                <a:lnRef idx="2">
-                  <a:schemeClr val="accent1">
-                    <a:shade val="50000"/>
-                  </a:schemeClr>
-                </a:lnRef>
-                <a:fillRef idx="1">
-                  <a:schemeClr val="accent1"/>
-                </a:fillRef>
-                <a:effectRef idx="0">
-                  <a:schemeClr val="accent1"/>
-                </a:effectRef>
-                <a:fontRef idx="minor">
-                  <a:schemeClr val="lt1"/>
-                </a:fontRef>
-              </p:style>
-              <p:txBody>
-                <a:bodyPr rtlCol="0" anchor="ctr"/>
-                <a:lstStyle/>
-                <a:p>
-                  <a:pPr algn="ctr"/>
-                  <a:endParaRPr lang="en-GB"/>
-                </a:p>
-              </p:txBody>
-            </p:sp>
-            <p:sp>
-              <p:nvSpPr>
-                <p:cNvPr id="17" name="Oval 16">
-                  <a:extLst>
-                    <a:ext uri="{FF2B5EF4-FFF2-40B4-BE49-F238E27FC236}">
-                      <a16:creationId xmlns:a16="http://schemas.microsoft.com/office/drawing/2014/main" id="{EC3C279D-E575-41CD-AE60-E0B6BC8E290A}"/>
-                    </a:ext>
-                  </a:extLst>
-                </p:cNvPr>
-                <p:cNvSpPr/>
-                <p:nvPr/>
-              </p:nvSpPr>
-              <p:spPr>
-                <a:xfrm>
-                  <a:off x="4919172" y="4646362"/>
-                  <a:ext cx="452967" cy="452967"/>
-                </a:xfrm>
-                <a:prstGeom prst="ellipse">
-                  <a:avLst/>
-                </a:prstGeom>
-                <a:noFill/>
-                <a:ln w="38100">
-                  <a:solidFill>
-                    <a:schemeClr val="bg1"/>
-                  </a:solidFill>
-                </a:ln>
-              </p:spPr>
-              <p:style>
-                <a:lnRef idx="2">
-                  <a:schemeClr val="accent1">
-                    <a:shade val="50000"/>
-                  </a:schemeClr>
-                </a:lnRef>
-                <a:fillRef idx="1">
-                  <a:schemeClr val="accent1"/>
-                </a:fillRef>
-                <a:effectRef idx="0">
-                  <a:schemeClr val="accent1"/>
-                </a:effectRef>
-                <a:fontRef idx="minor">
-                  <a:schemeClr val="lt1"/>
-                </a:fontRef>
-              </p:style>
-              <p:txBody>
-                <a:bodyPr rtlCol="0" anchor="ctr"/>
-                <a:lstStyle/>
-                <a:p>
-                  <a:pPr algn="ctr"/>
-                  <a:endParaRPr lang="en-GB"/>
-                </a:p>
-              </p:txBody>
-            </p:sp>
-            <p:sp>
-              <p:nvSpPr>
-                <p:cNvPr id="18" name="Oval 17">
-                  <a:extLst>
-                    <a:ext uri="{FF2B5EF4-FFF2-40B4-BE49-F238E27FC236}">
-                      <a16:creationId xmlns:a16="http://schemas.microsoft.com/office/drawing/2014/main" id="{FF6950A1-D728-40A8-B82D-D726D5D95522}"/>
-                    </a:ext>
-                  </a:extLst>
-                </p:cNvPr>
-                <p:cNvSpPr/>
-                <p:nvPr/>
-              </p:nvSpPr>
-              <p:spPr>
-                <a:xfrm>
-                  <a:off x="6815707" y="4646358"/>
-                  <a:ext cx="452967" cy="452967"/>
-                </a:xfrm>
-                <a:prstGeom prst="ellipse">
-                  <a:avLst/>
-                </a:prstGeom>
-                <a:noFill/>
-                <a:ln w="38100">
-                  <a:solidFill>
-                    <a:schemeClr val="bg1"/>
-                  </a:solidFill>
-                </a:ln>
-              </p:spPr>
-              <p:style>
-                <a:lnRef idx="2">
-                  <a:schemeClr val="accent1">
-                    <a:shade val="50000"/>
-                  </a:schemeClr>
-                </a:lnRef>
-                <a:fillRef idx="1">
-                  <a:schemeClr val="accent1"/>
-                </a:fillRef>
-                <a:effectRef idx="0">
-                  <a:schemeClr val="accent1"/>
-                </a:effectRef>
-                <a:fontRef idx="minor">
-                  <a:schemeClr val="lt1"/>
-                </a:fontRef>
-              </p:style>
-              <p:txBody>
-                <a:bodyPr rtlCol="0" anchor="ctr"/>
-                <a:lstStyle/>
-                <a:p>
-                  <a:pPr algn="ctr"/>
-                  <a:endParaRPr lang="en-GB"/>
-                </a:p>
-              </p:txBody>
-            </p:sp>
-          </p:grpSp>
-          <p:cxnSp>
-            <p:nvCxnSpPr>
-              <p:cNvPr id="7" name="Straight Connector 6">
-                <a:extLst>
-                  <a:ext uri="{FF2B5EF4-FFF2-40B4-BE49-F238E27FC236}">
-                    <a16:creationId xmlns:a16="http://schemas.microsoft.com/office/drawing/2014/main" id="{5C71E9E4-EFB1-4776-B8DA-9FDD06E95433}"/>
-                  </a:ext>
-                </a:extLst>
-              </p:cNvPr>
-              <p:cNvCxnSpPr>
-                <a:stCxn id="16" idx="0"/>
-                <a:endCxn id="15" idx="3"/>
-              </p:cNvCxnSpPr>
-              <p:nvPr/>
-            </p:nvCxnSpPr>
+            </p:nvSpPr>
             <p:spPr>
               <a:xfrm>
-                <a:off x="6303575" y="2039670"/>
-                <a:ext cx="876980" cy="468152"/>
+                <a:off x="6837485" y="1758673"/>
+                <a:ext cx="452967" cy="452967"/>
               </a:xfrm>
-              <a:prstGeom prst="line">
+              <a:prstGeom prst="ellipse">
                 <a:avLst/>
               </a:prstGeom>
+              <a:noFill/>
               <a:ln w="38100">
                 <a:solidFill>
                   <a:schemeClr val="bg1"/>
@@ -4650,43 +5048,51 @@
               </a:ln>
             </p:spPr>
             <p:style>
-              <a:lnRef idx="1">
-                <a:schemeClr val="accent1"/>
+              <a:lnRef idx="2">
+                <a:schemeClr val="accent1">
+                  <a:shade val="50000"/>
+                </a:schemeClr>
               </a:lnRef>
-              <a:fillRef idx="0">
+              <a:fillRef idx="1">
                 <a:schemeClr val="accent1"/>
               </a:fillRef>
               <a:effectRef idx="0">
                 <a:schemeClr val="accent1"/>
               </a:effectRef>
               <a:fontRef idx="minor">
-                <a:schemeClr val="tx1"/>
+                <a:schemeClr val="lt1"/>
               </a:fontRef>
             </p:style>
-          </p:cxnSp>
-          <p:cxnSp>
-            <p:nvCxnSpPr>
-              <p:cNvPr id="8" name="Straight Connector 7">
+            <p:txBody>
+              <a:bodyPr rtlCol="0" anchor="ctr"/>
+              <a:lstStyle/>
+              <a:p>
+                <a:pPr algn="ctr"/>
+                <a:endParaRPr lang="en-GB"/>
+              </a:p>
+            </p:txBody>
+          </p:sp>
+          <p:sp>
+            <p:nvSpPr>
+              <p:cNvPr id="15" name="Oval 14">
                 <a:extLst>
                   <a:ext uri="{FF2B5EF4-FFF2-40B4-BE49-F238E27FC236}">
-                    <a16:creationId xmlns:a16="http://schemas.microsoft.com/office/drawing/2014/main" id="{751751DE-27B6-4AAC-BA42-D2123A0BA5E5}"/>
+                    <a16:creationId xmlns:a16="http://schemas.microsoft.com/office/drawing/2014/main" id="{539B73C9-A0EC-46DB-A5FF-7B3E5B34AB1E}"/>
                   </a:ext>
                 </a:extLst>
               </p:cNvPr>
-              <p:cNvCxnSpPr>
-                <a:stCxn id="17" idx="1"/>
-                <a:endCxn id="16" idx="4"/>
-              </p:cNvCxnSpPr>
+              <p:cNvSpPr/>
               <p:nvPr/>
-            </p:nvCxnSpPr>
+            </p:nvSpPr>
             <p:spPr>
-              <a:xfrm flipV="1">
-                <a:off x="5050845" y="2039670"/>
-                <a:ext cx="876984" cy="468152"/>
+              <a:xfrm>
+                <a:off x="4919172" y="1758672"/>
+                <a:ext cx="452967" cy="452967"/>
               </a:xfrm>
-              <a:prstGeom prst="line">
+              <a:prstGeom prst="ellipse">
                 <a:avLst/>
               </a:prstGeom>
+              <a:noFill/>
               <a:ln w="38100">
                 <a:solidFill>
                   <a:schemeClr val="bg1"/>
@@ -4694,43 +5100,51 @@
               </a:ln>
             </p:spPr>
             <p:style>
-              <a:lnRef idx="1">
-                <a:schemeClr val="accent1"/>
+              <a:lnRef idx="2">
+                <a:schemeClr val="accent1">
+                  <a:shade val="50000"/>
+                </a:schemeClr>
               </a:lnRef>
-              <a:fillRef idx="0">
+              <a:fillRef idx="1">
                 <a:schemeClr val="accent1"/>
               </a:fillRef>
               <a:effectRef idx="0">
                 <a:schemeClr val="accent1"/>
               </a:effectRef>
               <a:fontRef idx="minor">
-                <a:schemeClr val="tx1"/>
+                <a:schemeClr val="lt1"/>
               </a:fontRef>
             </p:style>
-          </p:cxnSp>
-          <p:cxnSp>
-            <p:nvCxnSpPr>
-              <p:cNvPr id="9" name="Straight Connector 8">
+            <p:txBody>
+              <a:bodyPr rtlCol="0" anchor="ctr"/>
+              <a:lstStyle/>
+              <a:p>
+                <a:pPr algn="ctr"/>
+                <a:endParaRPr lang="en-GB"/>
+              </a:p>
+            </p:txBody>
+          </p:sp>
+          <p:sp>
+            <p:nvSpPr>
+              <p:cNvPr id="16" name="Oval 15">
                 <a:extLst>
                   <a:ext uri="{FF2B5EF4-FFF2-40B4-BE49-F238E27FC236}">
-                    <a16:creationId xmlns:a16="http://schemas.microsoft.com/office/drawing/2014/main" id="{BAAE3D73-2609-4846-8072-24F57C12C9A8}"/>
+                    <a16:creationId xmlns:a16="http://schemas.microsoft.com/office/drawing/2014/main" id="{73FC7C1C-F127-4FB7-AB11-390D6492462C}"/>
                   </a:ext>
                 </a:extLst>
               </p:cNvPr>
-              <p:cNvCxnSpPr>
-                <a:stCxn id="15" idx="5"/>
-                <a:endCxn id="18" idx="1"/>
-              </p:cNvCxnSpPr>
+              <p:cNvSpPr/>
               <p:nvPr/>
-            </p:nvCxnSpPr>
+            </p:nvSpPr>
             <p:spPr>
-              <a:xfrm flipH="1">
-                <a:off x="5050848" y="2773514"/>
-                <a:ext cx="2129707" cy="1307526"/>
+              <a:xfrm>
+                <a:off x="4194661" y="3202514"/>
+                <a:ext cx="452967" cy="452967"/>
               </a:xfrm>
-              <a:prstGeom prst="line">
+              <a:prstGeom prst="ellipse">
                 <a:avLst/>
               </a:prstGeom>
+              <a:noFill/>
               <a:ln w="38100">
                 <a:solidFill>
                   <a:schemeClr val="bg1"/>
@@ -4738,43 +5152,51 @@
               </a:ln>
             </p:spPr>
             <p:style>
-              <a:lnRef idx="1">
-                <a:schemeClr val="accent1"/>
+              <a:lnRef idx="2">
+                <a:schemeClr val="accent1">
+                  <a:shade val="50000"/>
+                </a:schemeClr>
               </a:lnRef>
-              <a:fillRef idx="0">
+              <a:fillRef idx="1">
                 <a:schemeClr val="accent1"/>
               </a:fillRef>
               <a:effectRef idx="0">
                 <a:schemeClr val="accent1"/>
               </a:effectRef>
               <a:fontRef idx="minor">
-                <a:schemeClr val="tx1"/>
+                <a:schemeClr val="lt1"/>
               </a:fontRef>
             </p:style>
-          </p:cxnSp>
-          <p:cxnSp>
-            <p:nvCxnSpPr>
-              <p:cNvPr id="10" name="Straight Connector 9">
+            <p:txBody>
+              <a:bodyPr rtlCol="0" anchor="ctr"/>
+              <a:lstStyle/>
+              <a:p>
+                <a:pPr algn="ctr"/>
+                <a:endParaRPr lang="en-GB"/>
+              </a:p>
+            </p:txBody>
+          </p:sp>
+          <p:sp>
+            <p:nvSpPr>
+              <p:cNvPr id="17" name="Oval 16">
                 <a:extLst>
                   <a:ext uri="{FF2B5EF4-FFF2-40B4-BE49-F238E27FC236}">
-                    <a16:creationId xmlns:a16="http://schemas.microsoft.com/office/drawing/2014/main" id="{B9F47467-B106-4800-AD2E-0221AB625D2D}"/>
+                    <a16:creationId xmlns:a16="http://schemas.microsoft.com/office/drawing/2014/main" id="{EC3C279D-E575-41CD-AE60-E0B6BC8E290A}"/>
                   </a:ext>
                 </a:extLst>
               </p:cNvPr>
-              <p:cNvCxnSpPr>
-                <a:stCxn id="17" idx="6"/>
-                <a:endCxn id="18" idx="2"/>
-              </p:cNvCxnSpPr>
+              <p:cNvSpPr/>
               <p:nvPr/>
-            </p:nvCxnSpPr>
+            </p:nvSpPr>
             <p:spPr>
               <a:xfrm>
-                <a:off x="4917999" y="2828541"/>
-                <a:ext cx="3" cy="1197472"/>
+                <a:off x="4919172" y="4646362"/>
+                <a:ext cx="452967" cy="452967"/>
               </a:xfrm>
-              <a:prstGeom prst="line">
+              <a:prstGeom prst="ellipse">
                 <a:avLst/>
               </a:prstGeom>
+              <a:noFill/>
               <a:ln w="38100">
                 <a:solidFill>
                   <a:schemeClr val="bg1"/>
@@ -4782,43 +5204,51 @@
               </a:ln>
             </p:spPr>
             <p:style>
-              <a:lnRef idx="1">
-                <a:schemeClr val="accent1"/>
+              <a:lnRef idx="2">
+                <a:schemeClr val="accent1">
+                  <a:shade val="50000"/>
+                </a:schemeClr>
               </a:lnRef>
-              <a:fillRef idx="0">
+              <a:fillRef idx="1">
                 <a:schemeClr val="accent1"/>
               </a:fillRef>
               <a:effectRef idx="0">
                 <a:schemeClr val="accent1"/>
               </a:effectRef>
               <a:fontRef idx="minor">
-                <a:schemeClr val="tx1"/>
+                <a:schemeClr val="lt1"/>
               </a:fontRef>
             </p:style>
-          </p:cxnSp>
-          <p:cxnSp>
-            <p:nvCxnSpPr>
-              <p:cNvPr id="11" name="Straight Connector 10">
+            <p:txBody>
+              <a:bodyPr rtlCol="0" anchor="ctr"/>
+              <a:lstStyle/>
+              <a:p>
+                <a:pPr algn="ctr"/>
+                <a:endParaRPr lang="en-GB"/>
+              </a:p>
+            </p:txBody>
+          </p:sp>
+          <p:sp>
+            <p:nvSpPr>
+              <p:cNvPr id="18" name="Oval 17">
                 <a:extLst>
                   <a:ext uri="{FF2B5EF4-FFF2-40B4-BE49-F238E27FC236}">
-                    <a16:creationId xmlns:a16="http://schemas.microsoft.com/office/drawing/2014/main" id="{0C6E5463-8AB5-4EA5-AB51-03C076962C7D}"/>
+                    <a16:creationId xmlns:a16="http://schemas.microsoft.com/office/drawing/2014/main" id="{FF6950A1-D728-40A8-B82D-D726D5D95522}"/>
                   </a:ext>
                 </a:extLst>
               </p:cNvPr>
-              <p:cNvCxnSpPr>
-                <a:stCxn id="18" idx="7"/>
-                <a:endCxn id="13" idx="3"/>
-              </p:cNvCxnSpPr>
+              <p:cNvSpPr/>
               <p:nvPr/>
-            </p:nvCxnSpPr>
+            </p:nvSpPr>
             <p:spPr>
               <a:xfrm>
-                <a:off x="5050848" y="4346732"/>
-                <a:ext cx="876981" cy="471598"/>
+                <a:off x="6815707" y="4646358"/>
+                <a:ext cx="452967" cy="452967"/>
               </a:xfrm>
-              <a:prstGeom prst="line">
+              <a:prstGeom prst="ellipse">
                 <a:avLst/>
               </a:prstGeom>
+              <a:noFill/>
               <a:ln w="38100">
                 <a:solidFill>
                   <a:schemeClr val="bg1"/>
@@ -4826,65 +5256,295 @@
               </a:ln>
             </p:spPr>
             <p:style>
-              <a:lnRef idx="1">
-                <a:schemeClr val="accent1"/>
+              <a:lnRef idx="2">
+                <a:schemeClr val="accent1">
+                  <a:shade val="50000"/>
+                </a:schemeClr>
               </a:lnRef>
-              <a:fillRef idx="0">
+              <a:fillRef idx="1">
                 <a:schemeClr val="accent1"/>
               </a:fillRef>
               <a:effectRef idx="0">
                 <a:schemeClr val="accent1"/>
               </a:effectRef>
               <a:fontRef idx="minor">
-                <a:schemeClr val="tx1"/>
+                <a:schemeClr val="lt1"/>
               </a:fontRef>
             </p:style>
-          </p:cxnSp>
-          <p:cxnSp>
-            <p:nvCxnSpPr>
-              <p:cNvPr id="12" name="Straight Connector 11">
-                <a:extLst>
-                  <a:ext uri="{FF2B5EF4-FFF2-40B4-BE49-F238E27FC236}">
-                    <a16:creationId xmlns:a16="http://schemas.microsoft.com/office/drawing/2014/main" id="{B7D5317E-5625-485E-9F47-05EAA17DE7FC}"/>
-                  </a:ext>
-                </a:extLst>
-              </p:cNvPr>
-              <p:cNvCxnSpPr>
-                <a:stCxn id="14" idx="5"/>
-                <a:endCxn id="13" idx="0"/>
-              </p:cNvCxnSpPr>
-              <p:nvPr/>
-            </p:nvCxnSpPr>
-            <p:spPr>
-              <a:xfrm flipH="1">
-                <a:off x="6303575" y="4364797"/>
-                <a:ext cx="876980" cy="453533"/>
-              </a:xfrm>
-              <a:prstGeom prst="line">
-                <a:avLst/>
-              </a:prstGeom>
-              <a:ln w="38100">
-                <a:solidFill>
-                  <a:schemeClr val="bg1"/>
-                </a:solidFill>
-              </a:ln>
-            </p:spPr>
-            <p:style>
-              <a:lnRef idx="1">
-                <a:schemeClr val="accent1"/>
-              </a:lnRef>
-              <a:fillRef idx="0">
-                <a:schemeClr val="accent1"/>
-              </a:fillRef>
-              <a:effectRef idx="0">
-                <a:schemeClr val="accent1"/>
-              </a:effectRef>
-              <a:fontRef idx="minor">
-                <a:schemeClr val="tx1"/>
-              </a:fontRef>
-            </p:style>
-          </p:cxnSp>
+            <p:txBody>
+              <a:bodyPr rtlCol="0" anchor="ctr"/>
+              <a:lstStyle/>
+              <a:p>
+                <a:pPr algn="ctr"/>
+                <a:endParaRPr lang="en-GB"/>
+              </a:p>
+            </p:txBody>
+          </p:sp>
         </p:grpSp>
+        <p:cxnSp>
+          <p:nvCxnSpPr>
+            <p:cNvPr id="7" name="Straight Connector 6">
+              <a:extLst>
+                <a:ext uri="{FF2B5EF4-FFF2-40B4-BE49-F238E27FC236}">
+                  <a16:creationId xmlns:a16="http://schemas.microsoft.com/office/drawing/2014/main" id="{5C71E9E4-EFB1-4776-B8DA-9FDD06E95433}"/>
+                </a:ext>
+              </a:extLst>
+            </p:cNvPr>
+            <p:cNvCxnSpPr>
+              <a:stCxn id="16" idx="0"/>
+              <a:endCxn id="15" idx="3"/>
+            </p:cNvCxnSpPr>
+            <p:nvPr/>
+          </p:nvCxnSpPr>
+          <p:spPr>
+            <a:xfrm>
+              <a:off x="6303575" y="2039670"/>
+              <a:ext cx="876980" cy="468152"/>
+            </a:xfrm>
+            <a:prstGeom prst="line">
+              <a:avLst/>
+            </a:prstGeom>
+            <a:ln w="38100">
+              <a:solidFill>
+                <a:schemeClr val="bg1"/>
+              </a:solidFill>
+            </a:ln>
+          </p:spPr>
+          <p:style>
+            <a:lnRef idx="1">
+              <a:schemeClr val="accent1"/>
+            </a:lnRef>
+            <a:fillRef idx="0">
+              <a:schemeClr val="accent1"/>
+            </a:fillRef>
+            <a:effectRef idx="0">
+              <a:schemeClr val="accent1"/>
+            </a:effectRef>
+            <a:fontRef idx="minor">
+              <a:schemeClr val="tx1"/>
+            </a:fontRef>
+          </p:style>
+        </p:cxnSp>
+        <p:cxnSp>
+          <p:nvCxnSpPr>
+            <p:cNvPr id="8" name="Straight Connector 7">
+              <a:extLst>
+                <a:ext uri="{FF2B5EF4-FFF2-40B4-BE49-F238E27FC236}">
+                  <a16:creationId xmlns:a16="http://schemas.microsoft.com/office/drawing/2014/main" id="{751751DE-27B6-4AAC-BA42-D2123A0BA5E5}"/>
+                </a:ext>
+              </a:extLst>
+            </p:cNvPr>
+            <p:cNvCxnSpPr>
+              <a:stCxn id="17" idx="1"/>
+              <a:endCxn id="16" idx="4"/>
+            </p:cNvCxnSpPr>
+            <p:nvPr/>
+          </p:nvCxnSpPr>
+          <p:spPr>
+            <a:xfrm flipV="1">
+              <a:off x="5050845" y="2039670"/>
+              <a:ext cx="876984" cy="468152"/>
+            </a:xfrm>
+            <a:prstGeom prst="line">
+              <a:avLst/>
+            </a:prstGeom>
+            <a:ln w="38100">
+              <a:solidFill>
+                <a:schemeClr val="bg1"/>
+              </a:solidFill>
+            </a:ln>
+          </p:spPr>
+          <p:style>
+            <a:lnRef idx="1">
+              <a:schemeClr val="accent1"/>
+            </a:lnRef>
+            <a:fillRef idx="0">
+              <a:schemeClr val="accent1"/>
+            </a:fillRef>
+            <a:effectRef idx="0">
+              <a:schemeClr val="accent1"/>
+            </a:effectRef>
+            <a:fontRef idx="minor">
+              <a:schemeClr val="tx1"/>
+            </a:fontRef>
+          </p:style>
+        </p:cxnSp>
+        <p:cxnSp>
+          <p:nvCxnSpPr>
+            <p:cNvPr id="9" name="Straight Connector 8">
+              <a:extLst>
+                <a:ext uri="{FF2B5EF4-FFF2-40B4-BE49-F238E27FC236}">
+                  <a16:creationId xmlns:a16="http://schemas.microsoft.com/office/drawing/2014/main" id="{BAAE3D73-2609-4846-8072-24F57C12C9A8}"/>
+                </a:ext>
+              </a:extLst>
+            </p:cNvPr>
+            <p:cNvCxnSpPr>
+              <a:stCxn id="15" idx="5"/>
+              <a:endCxn id="18" idx="1"/>
+            </p:cNvCxnSpPr>
+            <p:nvPr/>
+          </p:nvCxnSpPr>
+          <p:spPr>
+            <a:xfrm flipH="1">
+              <a:off x="5050848" y="2773514"/>
+              <a:ext cx="2129707" cy="1307526"/>
+            </a:xfrm>
+            <a:prstGeom prst="line">
+              <a:avLst/>
+            </a:prstGeom>
+            <a:ln w="38100">
+              <a:solidFill>
+                <a:schemeClr val="bg1"/>
+              </a:solidFill>
+            </a:ln>
+          </p:spPr>
+          <p:style>
+            <a:lnRef idx="1">
+              <a:schemeClr val="accent1"/>
+            </a:lnRef>
+            <a:fillRef idx="0">
+              <a:schemeClr val="accent1"/>
+            </a:fillRef>
+            <a:effectRef idx="0">
+              <a:schemeClr val="accent1"/>
+            </a:effectRef>
+            <a:fontRef idx="minor">
+              <a:schemeClr val="tx1"/>
+            </a:fontRef>
+          </p:style>
+        </p:cxnSp>
+        <p:cxnSp>
+          <p:nvCxnSpPr>
+            <p:cNvPr id="10" name="Straight Connector 9">
+              <a:extLst>
+                <a:ext uri="{FF2B5EF4-FFF2-40B4-BE49-F238E27FC236}">
+                  <a16:creationId xmlns:a16="http://schemas.microsoft.com/office/drawing/2014/main" id="{B9F47467-B106-4800-AD2E-0221AB625D2D}"/>
+                </a:ext>
+              </a:extLst>
+            </p:cNvPr>
+            <p:cNvCxnSpPr>
+              <a:stCxn id="17" idx="6"/>
+              <a:endCxn id="18" idx="2"/>
+            </p:cNvCxnSpPr>
+            <p:nvPr/>
+          </p:nvCxnSpPr>
+          <p:spPr>
+            <a:xfrm>
+              <a:off x="4917999" y="2828541"/>
+              <a:ext cx="3" cy="1197472"/>
+            </a:xfrm>
+            <a:prstGeom prst="line">
+              <a:avLst/>
+            </a:prstGeom>
+            <a:ln w="38100">
+              <a:solidFill>
+                <a:schemeClr val="bg1"/>
+              </a:solidFill>
+            </a:ln>
+          </p:spPr>
+          <p:style>
+            <a:lnRef idx="1">
+              <a:schemeClr val="accent1"/>
+            </a:lnRef>
+            <a:fillRef idx="0">
+              <a:schemeClr val="accent1"/>
+            </a:fillRef>
+            <a:effectRef idx="0">
+              <a:schemeClr val="accent1"/>
+            </a:effectRef>
+            <a:fontRef idx="minor">
+              <a:schemeClr val="tx1"/>
+            </a:fontRef>
+          </p:style>
+        </p:cxnSp>
+        <p:cxnSp>
+          <p:nvCxnSpPr>
+            <p:cNvPr id="11" name="Straight Connector 10">
+              <a:extLst>
+                <a:ext uri="{FF2B5EF4-FFF2-40B4-BE49-F238E27FC236}">
+                  <a16:creationId xmlns:a16="http://schemas.microsoft.com/office/drawing/2014/main" id="{0C6E5463-8AB5-4EA5-AB51-03C076962C7D}"/>
+                </a:ext>
+              </a:extLst>
+            </p:cNvPr>
+            <p:cNvCxnSpPr>
+              <a:stCxn id="18" idx="7"/>
+              <a:endCxn id="13" idx="3"/>
+            </p:cNvCxnSpPr>
+            <p:nvPr/>
+          </p:nvCxnSpPr>
+          <p:spPr>
+            <a:xfrm>
+              <a:off x="5050848" y="4346732"/>
+              <a:ext cx="876981" cy="471598"/>
+            </a:xfrm>
+            <a:prstGeom prst="line">
+              <a:avLst/>
+            </a:prstGeom>
+            <a:ln w="38100">
+              <a:solidFill>
+                <a:schemeClr val="bg1"/>
+              </a:solidFill>
+            </a:ln>
+          </p:spPr>
+          <p:style>
+            <a:lnRef idx="1">
+              <a:schemeClr val="accent1"/>
+            </a:lnRef>
+            <a:fillRef idx="0">
+              <a:schemeClr val="accent1"/>
+            </a:fillRef>
+            <a:effectRef idx="0">
+              <a:schemeClr val="accent1"/>
+            </a:effectRef>
+            <a:fontRef idx="minor">
+              <a:schemeClr val="tx1"/>
+            </a:fontRef>
+          </p:style>
+        </p:cxnSp>
+        <p:cxnSp>
+          <p:nvCxnSpPr>
+            <p:cNvPr id="12" name="Straight Connector 11">
+              <a:extLst>
+                <a:ext uri="{FF2B5EF4-FFF2-40B4-BE49-F238E27FC236}">
+                  <a16:creationId xmlns:a16="http://schemas.microsoft.com/office/drawing/2014/main" id="{B7D5317E-5625-485E-9F47-05EAA17DE7FC}"/>
+                </a:ext>
+              </a:extLst>
+            </p:cNvPr>
+            <p:cNvCxnSpPr>
+              <a:stCxn id="14" idx="5"/>
+              <a:endCxn id="13" idx="0"/>
+            </p:cNvCxnSpPr>
+            <p:nvPr/>
+          </p:nvCxnSpPr>
+          <p:spPr>
+            <a:xfrm flipH="1">
+              <a:off x="6303575" y="4364797"/>
+              <a:ext cx="876980" cy="453533"/>
+            </a:xfrm>
+            <a:prstGeom prst="line">
+              <a:avLst/>
+            </a:prstGeom>
+            <a:ln w="38100">
+              <a:solidFill>
+                <a:schemeClr val="bg1"/>
+              </a:solidFill>
+            </a:ln>
+          </p:spPr>
+          <p:style>
+            <a:lnRef idx="1">
+              <a:schemeClr val="accent1"/>
+            </a:lnRef>
+            <a:fillRef idx="0">
+              <a:schemeClr val="accent1"/>
+            </a:fillRef>
+            <a:effectRef idx="0">
+              <a:schemeClr val="accent1"/>
+            </a:effectRef>
+            <a:fontRef idx="minor">
+              <a:schemeClr val="tx1"/>
+            </a:fontRef>
+          </p:style>
+        </p:cxnSp>
       </p:grpSp>
     </p:spTree>
     <p:extLst>

</xml_diff>

<commit_message>
📖 DOC: Add docstrings as Codacy Recommend
</commit_message>
<xml_diff>
--- a/admin/social/logo.pptx
+++ b/admin/social/logo.pptx
@@ -262,7 +262,7 @@
           <a:p>
             <a:fld id="{190B064C-8529-4F04-AA44-C2AD72BF0F43}" type="datetimeFigureOut">
               <a:rPr lang="en-GB" smtClean="0"/>
-              <a:t>11/12/2021</a:t>
+              <a:t>12/12/2021</a:t>
             </a:fld>
             <a:endParaRPr lang="en-GB"/>
           </a:p>
@@ -462,7 +462,7 @@
           <a:p>
             <a:fld id="{190B064C-8529-4F04-AA44-C2AD72BF0F43}" type="datetimeFigureOut">
               <a:rPr lang="en-GB" smtClean="0"/>
-              <a:t>11/12/2021</a:t>
+              <a:t>12/12/2021</a:t>
             </a:fld>
             <a:endParaRPr lang="en-GB"/>
           </a:p>
@@ -672,7 +672,7 @@
           <a:p>
             <a:fld id="{190B064C-8529-4F04-AA44-C2AD72BF0F43}" type="datetimeFigureOut">
               <a:rPr lang="en-GB" smtClean="0"/>
-              <a:t>11/12/2021</a:t>
+              <a:t>12/12/2021</a:t>
             </a:fld>
             <a:endParaRPr lang="en-GB"/>
           </a:p>
@@ -872,7 +872,7 @@
           <a:p>
             <a:fld id="{190B064C-8529-4F04-AA44-C2AD72BF0F43}" type="datetimeFigureOut">
               <a:rPr lang="en-GB" smtClean="0"/>
-              <a:t>11/12/2021</a:t>
+              <a:t>12/12/2021</a:t>
             </a:fld>
             <a:endParaRPr lang="en-GB"/>
           </a:p>
@@ -1148,7 +1148,7 @@
           <a:p>
             <a:fld id="{190B064C-8529-4F04-AA44-C2AD72BF0F43}" type="datetimeFigureOut">
               <a:rPr lang="en-GB" smtClean="0"/>
-              <a:t>11/12/2021</a:t>
+              <a:t>12/12/2021</a:t>
             </a:fld>
             <a:endParaRPr lang="en-GB"/>
           </a:p>
@@ -1416,7 +1416,7 @@
           <a:p>
             <a:fld id="{190B064C-8529-4F04-AA44-C2AD72BF0F43}" type="datetimeFigureOut">
               <a:rPr lang="en-GB" smtClean="0"/>
-              <a:t>11/12/2021</a:t>
+              <a:t>12/12/2021</a:t>
             </a:fld>
             <a:endParaRPr lang="en-GB"/>
           </a:p>
@@ -1831,7 +1831,7 @@
           <a:p>
             <a:fld id="{190B064C-8529-4F04-AA44-C2AD72BF0F43}" type="datetimeFigureOut">
               <a:rPr lang="en-GB" smtClean="0"/>
-              <a:t>11/12/2021</a:t>
+              <a:t>12/12/2021</a:t>
             </a:fld>
             <a:endParaRPr lang="en-GB"/>
           </a:p>
@@ -1973,7 +1973,7 @@
           <a:p>
             <a:fld id="{190B064C-8529-4F04-AA44-C2AD72BF0F43}" type="datetimeFigureOut">
               <a:rPr lang="en-GB" smtClean="0"/>
-              <a:t>11/12/2021</a:t>
+              <a:t>12/12/2021</a:t>
             </a:fld>
             <a:endParaRPr lang="en-GB"/>
           </a:p>
@@ -2086,7 +2086,7 @@
           <a:p>
             <a:fld id="{190B064C-8529-4F04-AA44-C2AD72BF0F43}" type="datetimeFigureOut">
               <a:rPr lang="en-GB" smtClean="0"/>
-              <a:t>11/12/2021</a:t>
+              <a:t>12/12/2021</a:t>
             </a:fld>
             <a:endParaRPr lang="en-GB"/>
           </a:p>
@@ -2399,7 +2399,7 @@
           <a:p>
             <a:fld id="{190B064C-8529-4F04-AA44-C2AD72BF0F43}" type="datetimeFigureOut">
               <a:rPr lang="en-GB" smtClean="0"/>
-              <a:t>11/12/2021</a:t>
+              <a:t>12/12/2021</a:t>
             </a:fld>
             <a:endParaRPr lang="en-GB"/>
           </a:p>
@@ -2688,7 +2688,7 @@
           <a:p>
             <a:fld id="{190B064C-8529-4F04-AA44-C2AD72BF0F43}" type="datetimeFigureOut">
               <a:rPr lang="en-GB" smtClean="0"/>
-              <a:t>11/12/2021</a:t>
+              <a:t>12/12/2021</a:t>
             </a:fld>
             <a:endParaRPr lang="en-GB"/>
           </a:p>
@@ -2931,7 +2931,7 @@
           <a:p>
             <a:fld id="{190B064C-8529-4F04-AA44-C2AD72BF0F43}" type="datetimeFigureOut">
               <a:rPr lang="en-GB" smtClean="0"/>
-              <a:t>11/12/2021</a:t>
+              <a:t>12/12/2021</a:t>
             </a:fld>
             <a:endParaRPr lang="en-GB"/>
           </a:p>

</xml_diff>